<commit_message>
Correction déclaration log4j private static Logger logger = Logger.getLogger(Combination.class); Modification du nom de la classe dans toutes les classes utilisant les logs
</commit_message>
<xml_diff>
--- a/Mettez votre logique à l'épreuve.pptx
+++ b/Mettez votre logique à l'épreuve.pptx
@@ -4547,6 +4547,13 @@
   <p:clrMapOvr>
     <a:masterClrMapping/>
   </p:clrMapOvr>
+  <p:timing>
+    <p:tnLst>
+      <p:par>
+        <p:cTn id="1" dur="indefinite" restart="never" nodeType="tmRoot"/>
+      </p:par>
+    </p:tnLst>
+  </p:timing>
 </p:sld>
 </file>
 
@@ -4759,6 +4766,13 @@
   <p:clrMapOvr>
     <a:masterClrMapping/>
   </p:clrMapOvr>
+  <p:timing>
+    <p:tnLst>
+      <p:par>
+        <p:cTn id="1" dur="indefinite" restart="never" nodeType="tmRoot"/>
+      </p:par>
+    </p:tnLst>
+  </p:timing>
 </p:sld>
 </file>
 
@@ -4954,6 +4968,13 @@
   <p:clrMapOvr>
     <a:masterClrMapping/>
   </p:clrMapOvr>
+  <p:timing>
+    <p:tnLst>
+      <p:par>
+        <p:cTn id="1" dur="indefinite" restart="never" nodeType="tmRoot"/>
+      </p:par>
+    </p:tnLst>
+  </p:timing>
 </p:sld>
 </file>
 
@@ -5123,6 +5144,13 @@
   <p:clrMapOvr>
     <a:masterClrMapping/>
   </p:clrMapOvr>
+  <p:timing>
+    <p:tnLst>
+      <p:par>
+        <p:cTn id="1" dur="indefinite" restart="never" nodeType="tmRoot"/>
+      </p:par>
+    </p:tnLst>
+  </p:timing>
 </p:sld>
 </file>
 
@@ -5201,6 +5229,13 @@
   <p:clrMapOvr>
     <a:masterClrMapping/>
   </p:clrMapOvr>
+  <p:timing>
+    <p:tnLst>
+      <p:par>
+        <p:cTn id="1" dur="indefinite" restart="never" nodeType="tmRoot"/>
+      </p:par>
+    </p:tnLst>
+  </p:timing>
 </p:sld>
 </file>
 
@@ -5447,6 +5482,13 @@
   <p:clrMapOvr>
     <a:masterClrMapping/>
   </p:clrMapOvr>
+  <p:timing>
+    <p:tnLst>
+      <p:par>
+        <p:cTn id="1" dur="indefinite" restart="never" nodeType="tmRoot"/>
+      </p:par>
+    </p:tnLst>
+  </p:timing>
 </p:sld>
 </file>
 
@@ -5525,6 +5567,13 @@
   <p:clrMapOvr>
     <a:masterClrMapping/>
   </p:clrMapOvr>
+  <p:timing>
+    <p:tnLst>
+      <p:par>
+        <p:cTn id="1" dur="indefinite" restart="never" nodeType="tmRoot"/>
+      </p:par>
+    </p:tnLst>
+  </p:timing>
 </p:sld>
 </file>
 
@@ -5615,6 +5664,13 @@
   <p:clrMapOvr>
     <a:masterClrMapping/>
   </p:clrMapOvr>
+  <p:timing>
+    <p:tnLst>
+      <p:par>
+        <p:cTn id="1" dur="indefinite" restart="never" nodeType="tmRoot"/>
+      </p:par>
+    </p:tnLst>
+  </p:timing>
 </p:sld>
 </file>
 
@@ -5693,6 +5749,13 @@
   <p:clrMapOvr>
     <a:masterClrMapping/>
   </p:clrMapOvr>
+  <p:timing>
+    <p:tnLst>
+      <p:par>
+        <p:cTn id="1" dur="indefinite" restart="never" nodeType="tmRoot"/>
+      </p:par>
+    </p:tnLst>
+  </p:timing>
 </p:sld>
 </file>
 
@@ -6158,6 +6221,13 @@
   <p:clrMapOvr>
     <a:masterClrMapping/>
   </p:clrMapOvr>
+  <p:timing>
+    <p:tnLst>
+      <p:par>
+        <p:cTn id="1" dur="indefinite" restart="never" nodeType="tmRoot"/>
+      </p:par>
+    </p:tnLst>
+  </p:timing>
 </p:sld>
 </file>
 
@@ -6319,6 +6389,13 @@
   <p:clrMapOvr>
     <a:masterClrMapping/>
   </p:clrMapOvr>
+  <p:timing>
+    <p:tnLst>
+      <p:par>
+        <p:cTn id="1" dur="indefinite" restart="never" nodeType="tmRoot"/>
+      </p:par>
+    </p:tnLst>
+  </p:timing>
 </p:sld>
 </file>
 
@@ -6443,6 +6520,13 @@
   <p:clrMapOvr>
     <a:masterClrMapping/>
   </p:clrMapOvr>
+  <p:timing>
+    <p:tnLst>
+      <p:par>
+        <p:cTn id="1" dur="indefinite" restart="never" nodeType="tmRoot"/>
+      </p:par>
+    </p:tnLst>
+  </p:timing>
 </p:sld>
 </file>
 
@@ -6599,6 +6683,13 @@
   <p:clrMapOvr>
     <a:masterClrMapping/>
   </p:clrMapOvr>
+  <p:timing>
+    <p:tnLst>
+      <p:par>
+        <p:cTn id="1" dur="indefinite" restart="never" nodeType="tmRoot"/>
+      </p:par>
+    </p:tnLst>
+  </p:timing>
 </p:sld>
 </file>
 
@@ -6677,6 +6768,13 @@
   <p:clrMapOvr>
     <a:masterClrMapping/>
   </p:clrMapOvr>
+  <p:timing>
+    <p:tnLst>
+      <p:par>
+        <p:cTn id="1" dur="indefinite" restart="never" nodeType="tmRoot"/>
+      </p:par>
+    </p:tnLst>
+  </p:timing>
 </p:sld>
 </file>
 
@@ -6745,7 +6843,15 @@
             </a:r>
             <a:r>
               <a:rPr lang="fr-FR" dirty="0" smtClean="0"/>
-              <a:t> : lancer le fichier index.html pour avoir toute la document du projet et du </a:t>
+              <a:t> : lancer le fichier index.html pour avoir toute la </a:t>
+            </a:r>
+            <a:r>
+              <a:rPr lang="fr-FR" dirty="0" smtClean="0"/>
+              <a:t>documentation </a:t>
+            </a:r>
+            <a:r>
+              <a:rPr lang="fr-FR" dirty="0" smtClean="0"/>
+              <a:t>du projet et du </a:t>
             </a:r>
             <a:r>
               <a:rPr lang="fr-FR" b="1" dirty="0" smtClean="0"/>
@@ -6764,7 +6870,15 @@
           <a:p>
             <a:r>
               <a:rPr lang="fr-FR" dirty="0" smtClean="0"/>
-              <a:t>Dossier lib : continent la librairie log4j-1,2,17.jar permettant la gestion des logs </a:t>
+              <a:t>Dossier lib : </a:t>
+            </a:r>
+            <a:r>
+              <a:rPr lang="fr-FR" dirty="0" smtClean="0"/>
+              <a:t>contient </a:t>
+            </a:r>
+            <a:r>
+              <a:rPr lang="fr-FR" dirty="0" smtClean="0"/>
+              <a:t>la librairie log4j-1,2,17.jar permettant la gestion des logs </a:t>
             </a:r>
           </a:p>
           <a:p>
@@ -6806,7 +6920,15 @@
             </a:r>
             <a:r>
               <a:rPr lang="fr-FR" dirty="0" smtClean="0"/>
-              <a:t> : contient toutes les sources du projet (fichier class format .java)</a:t>
+              <a:t> : contient toutes les sources du projet (</a:t>
+            </a:r>
+            <a:r>
+              <a:rPr lang="fr-FR" dirty="0" smtClean="0"/>
+              <a:t>fichiers des class </a:t>
+            </a:r>
+            <a:r>
+              <a:rPr lang="fr-FR" dirty="0" smtClean="0"/>
+              <a:t>format .java)</a:t>
             </a:r>
           </a:p>
           <a:p>
@@ -6909,6 +7031,13 @@
   <p:clrMapOvr>
     <a:masterClrMapping/>
   </p:clrMapOvr>
+  <p:timing>
+    <p:tnLst>
+      <p:par>
+        <p:cTn id="1" dur="indefinite" restart="never" nodeType="tmRoot"/>
+      </p:par>
+    </p:tnLst>
+  </p:timing>
 </p:sld>
 </file>
 
@@ -7889,6 +8018,13 @@
   <p:clrMapOvr>
     <a:masterClrMapping/>
   </p:clrMapOvr>
+  <p:timing>
+    <p:tnLst>
+      <p:par>
+        <p:cTn id="1" dur="indefinite" restart="never" nodeType="tmRoot"/>
+      </p:par>
+    </p:tnLst>
+  </p:timing>
 </p:sld>
 </file>
 

</xml_diff>